<commit_message>
haven't undated or checked everything
</commit_message>
<xml_diff>
--- a/Checking_totSCoutput_instructions.pptx
+++ b/Checking_totSCoutput_instructions.pptx
@@ -523,11 +523,7 @@
             </a:r>
             <a:r>
               <a:rPr lang="en-US" dirty="0" smtClean="0"/>
-              <a:t> observations </a:t>
-            </a:r>
-            <a:r>
-              <a:rPr lang="en-US" smtClean="0"/>
-              <a:t>by category</a:t>
+              <a:t> observations by category</a:t>
             </a:r>
           </a:p>
           <a:p>
@@ -545,7 +541,7 @@
             </a:pPr>
             <a:r>
               <a:rPr lang="en-US" dirty="0" smtClean="0"/>
-              <a:t>          243           196           330           277           123           175            28           208 </a:t>
+              <a:t>          243           196           	330                   277           123               	 175            28           208 </a:t>
             </a:r>
           </a:p>
           <a:p>
@@ -563,7 +559,23 @@
             </a:pPr>
             <a:r>
               <a:rPr lang="en-US" dirty="0" smtClean="0"/>
-              <a:t>          123           265           112             0           157            39            85           199 </a:t>
+              <a:t>          123           265           	</a:t>
+            </a:r>
+            <a:r>
+              <a:rPr lang="en-US" baseline="0" dirty="0" smtClean="0"/>
+              <a:t>      </a:t>
+            </a:r>
+            <a:r>
+              <a:rPr lang="en-US" dirty="0" smtClean="0"/>
+              <a:t>112           </a:t>
+            </a:r>
+            <a:r>
+              <a:rPr lang="en-US" baseline="0" dirty="0" smtClean="0"/>
+              <a:t>   </a:t>
+            </a:r>
+            <a:r>
+              <a:rPr lang="en-US" dirty="0" smtClean="0"/>
+              <a:t>0	           157            39            85  	         199 </a:t>
             </a:r>
           </a:p>
           <a:p>
@@ -581,7 +593,7 @@
             </a:pPr>
             <a:r>
               <a:rPr lang="en-US" dirty="0" smtClean="0"/>
-              <a:t>          257             0           107            89            26             1            30             0 </a:t>
+              <a:t>          257             0          	 107          	  89            	26          	   1           	 30             0 </a:t>
             </a:r>
           </a:p>
           <a:p>
@@ -599,7 +611,7 @@
             </a:pPr>
             <a:r>
               <a:rPr lang="en-US" dirty="0" smtClean="0"/>
-              <a:t>           39             7            95           135            97             0            33            28 </a:t>
+              <a:t>           39             7          	  95          	 135            	97             0           	 33            28 </a:t>
             </a:r>
           </a:p>
           <a:p>

</xml_diff>